<commit_message>
Opdateret Præsentaiton med faseplan
</commit_message>
<xml_diff>
--- a/08-Project-Management/Milepæl A præsentation.pptx
+++ b/08-Project-Management/Milepæl A præsentation.pptx
@@ -110,6 +110,11 @@
       </a:defRPr>
     </a:lvl9pPr>
   </p:defaultTextStyle>
+  <p:extLst>
+    <p:ext uri="{EFAFB233-063F-42B5-8137-9DF3F51BA10A}">
+      <p15:sldGuideLst xmlns:p15="http://schemas.microsoft.com/office/powerpoint/2012/main"/>
+    </p:ext>
+  </p:extLst>
 </p:presentation>
 </file>
 
@@ -444,7 +449,7 @@
           <a:p>
             <a:fld id="{7A23E6F6-871D-4A23-B262-106ACD44E71B}" type="datetimeFigureOut">
               <a:rPr lang="da-DK" smtClean="0"/>
-              <a:t>03-05-2015</a:t>
+              <a:t>04-05-2015</a:t>
             </a:fld>
             <a:endParaRPr lang="da-DK"/>
           </a:p>
@@ -768,7 +773,7 @@
           <a:p>
             <a:fld id="{7A23E6F6-871D-4A23-B262-106ACD44E71B}" type="datetimeFigureOut">
               <a:rPr lang="da-DK" smtClean="0"/>
-              <a:t>03-05-2015</a:t>
+              <a:t>04-05-2015</a:t>
             </a:fld>
             <a:endParaRPr lang="da-DK"/>
           </a:p>
@@ -1016,7 +1021,7 @@
           <a:p>
             <a:fld id="{7A23E6F6-871D-4A23-B262-106ACD44E71B}" type="datetimeFigureOut">
               <a:rPr lang="da-DK" smtClean="0"/>
-              <a:t>03-05-2015</a:t>
+              <a:t>04-05-2015</a:t>
             </a:fld>
             <a:endParaRPr lang="da-DK"/>
           </a:p>
@@ -1355,7 +1360,7 @@
           <a:p>
             <a:fld id="{7A23E6F6-871D-4A23-B262-106ACD44E71B}" type="datetimeFigureOut">
               <a:rPr lang="da-DK" smtClean="0"/>
-              <a:t>03-05-2015</a:t>
+              <a:t>04-05-2015</a:t>
             </a:fld>
             <a:endParaRPr lang="da-DK"/>
           </a:p>
@@ -1702,7 +1707,7 @@
           <a:p>
             <a:fld id="{7A23E6F6-871D-4A23-B262-106ACD44E71B}" type="datetimeFigureOut">
               <a:rPr lang="da-DK" smtClean="0"/>
-              <a:t>03-05-2015</a:t>
+              <a:t>04-05-2015</a:t>
             </a:fld>
             <a:endParaRPr lang="da-DK"/>
           </a:p>
@@ -2076,7 +2081,7 @@
           <a:p>
             <a:fld id="{7A23E6F6-871D-4A23-B262-106ACD44E71B}" type="datetimeFigureOut">
               <a:rPr lang="da-DK" smtClean="0"/>
-              <a:t>03-05-2015</a:t>
+              <a:t>04-05-2015</a:t>
             </a:fld>
             <a:endParaRPr lang="da-DK"/>
           </a:p>
@@ -2546,7 +2551,7 @@
           <a:p>
             <a:fld id="{7A23E6F6-871D-4A23-B262-106ACD44E71B}" type="datetimeFigureOut">
               <a:rPr lang="da-DK" smtClean="0"/>
-              <a:t>03-05-2015</a:t>
+              <a:t>04-05-2015</a:t>
             </a:fld>
             <a:endParaRPr lang="da-DK"/>
           </a:p>
@@ -2751,7 +2756,7 @@
           <a:p>
             <a:fld id="{7A23E6F6-871D-4A23-B262-106ACD44E71B}" type="datetimeFigureOut">
               <a:rPr lang="da-DK" smtClean="0"/>
-              <a:t>03-05-2015</a:t>
+              <a:t>04-05-2015</a:t>
             </a:fld>
             <a:endParaRPr lang="da-DK"/>
           </a:p>
@@ -2962,7 +2967,7 @@
           <a:p>
             <a:fld id="{7A23E6F6-871D-4A23-B262-106ACD44E71B}" type="datetimeFigureOut">
               <a:rPr lang="da-DK" smtClean="0"/>
-              <a:t>03-05-2015</a:t>
+              <a:t>04-05-2015</a:t>
             </a:fld>
             <a:endParaRPr lang="da-DK"/>
           </a:p>
@@ -3194,7 +3199,7 @@
           <a:p>
             <a:fld id="{7A23E6F6-871D-4A23-B262-106ACD44E71B}" type="datetimeFigureOut">
               <a:rPr lang="da-DK" smtClean="0"/>
-              <a:t>03-05-2015</a:t>
+              <a:t>04-05-2015</a:t>
             </a:fld>
             <a:endParaRPr lang="da-DK"/>
           </a:p>
@@ -3442,7 +3447,7 @@
           <a:p>
             <a:fld id="{7A23E6F6-871D-4A23-B262-106ACD44E71B}" type="datetimeFigureOut">
               <a:rPr lang="da-DK" smtClean="0"/>
-              <a:t>03-05-2015</a:t>
+              <a:t>04-05-2015</a:t>
             </a:fld>
             <a:endParaRPr lang="da-DK"/>
           </a:p>
@@ -3740,7 +3745,7 @@
           <a:p>
             <a:fld id="{7A23E6F6-871D-4A23-B262-106ACD44E71B}" type="datetimeFigureOut">
               <a:rPr lang="da-DK" smtClean="0"/>
-              <a:t>03-05-2015</a:t>
+              <a:t>04-05-2015</a:t>
             </a:fld>
             <a:endParaRPr lang="da-DK"/>
           </a:p>
@@ -4134,7 +4139,7 @@
           <a:p>
             <a:fld id="{7A23E6F6-871D-4A23-B262-106ACD44E71B}" type="datetimeFigureOut">
               <a:rPr lang="da-DK" smtClean="0"/>
-              <a:t>03-05-2015</a:t>
+              <a:t>04-05-2015</a:t>
             </a:fld>
             <a:endParaRPr lang="da-DK"/>
           </a:p>
@@ -4283,7 +4288,7 @@
           <a:p>
             <a:fld id="{7A23E6F6-871D-4A23-B262-106ACD44E71B}" type="datetimeFigureOut">
               <a:rPr lang="da-DK" smtClean="0"/>
-              <a:t>03-05-2015</a:t>
+              <a:t>04-05-2015</a:t>
             </a:fld>
             <a:endParaRPr lang="da-DK"/>
           </a:p>
@@ -4409,7 +4414,7 @@
           <a:p>
             <a:fld id="{7A23E6F6-871D-4A23-B262-106ACD44E71B}" type="datetimeFigureOut">
               <a:rPr lang="da-DK" smtClean="0"/>
-              <a:t>03-05-2015</a:t>
+              <a:t>04-05-2015</a:t>
             </a:fld>
             <a:endParaRPr lang="da-DK"/>
           </a:p>
@@ -4664,7 +4669,7 @@
           <a:p>
             <a:fld id="{7A23E6F6-871D-4A23-B262-106ACD44E71B}" type="datetimeFigureOut">
               <a:rPr lang="da-DK" smtClean="0"/>
-              <a:t>03-05-2015</a:t>
+              <a:t>04-05-2015</a:t>
             </a:fld>
             <a:endParaRPr lang="da-DK"/>
           </a:p>
@@ -4979,7 +4984,7 @@
           <a:p>
             <a:fld id="{7A23E6F6-871D-4A23-B262-106ACD44E71B}" type="datetimeFigureOut">
               <a:rPr lang="da-DK" smtClean="0"/>
-              <a:t>03-05-2015</a:t>
+              <a:t>04-05-2015</a:t>
             </a:fld>
             <a:endParaRPr lang="da-DK"/>
           </a:p>
@@ -5330,7 +5335,7 @@
           <a:p>
             <a:fld id="{7A23E6F6-871D-4A23-B262-106ACD44E71B}" type="datetimeFigureOut">
               <a:rPr lang="da-DK" smtClean="0"/>
-              <a:t>03-05-2015</a:t>
+              <a:t>04-05-2015</a:t>
             </a:fld>
             <a:endParaRPr lang="da-DK"/>
           </a:p>
@@ -5890,7 +5895,11 @@
           <a:p>
             <a:r>
               <a:rPr lang="da-DK" dirty="0" smtClean="0"/>
-              <a:t>Milepæl a</a:t>
+              <a:t>Milepæl </a:t>
+            </a:r>
+            <a:r>
+              <a:rPr lang="da-DK" dirty="0" smtClean="0"/>
+              <a:t>A</a:t>
             </a:r>
             <a:endParaRPr lang="da-DK" dirty="0"/>
           </a:p>
@@ -6173,25 +6182,50 @@
           </a:p>
         </p:txBody>
       </p:sp>
-      <p:sp>
-        <p:nvSpPr>
-          <p:cNvPr id="3" name="Pladsholder til indhold 2"/>
-          <p:cNvSpPr>
-            <a:spLocks noGrp="1"/>
-          </p:cNvSpPr>
+      <p:pic>
+        <p:nvPicPr>
+          <p:cNvPr id="4" name="Pladsholder til indhold 3"/>
+          <p:cNvPicPr>
+            <a:picLocks noGrp="1" noChangeAspect="1"/>
+          </p:cNvPicPr>
           <p:nvPr>
             <p:ph idx="1"/>
           </p:nvPr>
-        </p:nvSpPr>
-        <p:spPr/>
-        <p:txBody>
-          <a:bodyPr/>
-          <a:lstStyle/>
-          <a:p>
-            <a:endParaRPr lang="da-DK"/>
-          </a:p>
-        </p:txBody>
-      </p:sp>
+        </p:nvPicPr>
+        <p:blipFill>
+          <a:blip r:embed="rId2">
+            <a:extLst>
+              <a:ext uri="{28A0092B-C50C-407E-A947-70E740481C1C}">
+                <a14:useLocalDpi xmlns:a14="http://schemas.microsoft.com/office/drawing/2010/main" val="0"/>
+              </a:ext>
+            </a:extLst>
+          </a:blip>
+          <a:stretch>
+            <a:fillRect/>
+          </a:stretch>
+        </p:blipFill>
+        <p:spPr>
+          <a:xfrm>
+            <a:off x="827238" y="2885736"/>
+            <a:ext cx="10537524" cy="1272489"/>
+          </a:xfrm>
+          <a:prstGeom prst="rect">
+            <a:avLst/>
+          </a:prstGeom>
+          <a:ln w="88900" cap="sq" cmpd="thickThin">
+            <a:solidFill>
+              <a:srgbClr val="000000"/>
+            </a:solidFill>
+            <a:prstDash val="solid"/>
+            <a:miter lim="800000"/>
+          </a:ln>
+          <a:effectLst>
+            <a:innerShdw blurRad="76200">
+              <a:srgbClr val="000000"/>
+            </a:innerShdw>
+          </a:effectLst>
+        </p:spPr>
+      </p:pic>
     </p:spTree>
     <p:extLst>
       <p:ext uri="{BB962C8B-B14F-4D97-AF65-F5344CB8AC3E}">
@@ -6238,20 +6272,20 @@
           <a:lstStyle/>
           <a:p>
             <a:r>
-              <a:rPr lang="da-DK" dirty="0" err="1"/>
-              <a:t>Iterationsplan</a:t>
+              <a:rPr lang="da-DK" dirty="0" smtClean="0"/>
+              <a:t>Plan for </a:t>
+            </a:r>
+            <a:r>
+              <a:rPr lang="da-DK" dirty="0" err="1" smtClean="0"/>
+              <a:t>Iteration</a:t>
+            </a:r>
+            <a:r>
+              <a:rPr lang="da-DK" dirty="0" smtClean="0"/>
+              <a:t> </a:t>
             </a:r>
             <a:r>
               <a:rPr lang="da-DK" dirty="0"/>
-              <a:t> for </a:t>
-            </a:r>
-            <a:r>
-              <a:rPr lang="da-DK" dirty="0" err="1"/>
-              <a:t>iteration</a:t>
-            </a:r>
-            <a:r>
-              <a:rPr lang="da-DK" dirty="0"/>
-              <a:t> 2</a:t>
+              <a:t>2</a:t>
             </a:r>
           </a:p>
         </p:txBody>
@@ -6343,17 +6377,14 @@
           <a:lstStyle/>
           <a:p>
             <a:r>
-              <a:rPr lang="da-DK" dirty="0"/>
-              <a:t>Overblik over identificerede </a:t>
-            </a:r>
-            <a:r>
-              <a:rPr lang="da-DK" dirty="0" err="1"/>
-              <a:t>use</a:t>
-            </a:r>
-            <a:r>
-              <a:rPr lang="da-DK" dirty="0"/>
-              <a:t> case</a:t>
-            </a:r>
+              <a:rPr lang="da-DK" dirty="0" err="1" smtClean="0"/>
+              <a:t>Use</a:t>
+            </a:r>
+            <a:r>
+              <a:rPr lang="da-DK" dirty="0" smtClean="0"/>
+              <a:t> Case Diagram</a:t>
+            </a:r>
+            <a:endParaRPr lang="da-DK" dirty="0"/>
           </a:p>
         </p:txBody>
       </p:sp>

</xml_diff>